<commit_message>
Reorganized IG, made UV, added adaptive operation
</commit_message>
<xml_diff>
--- a/background/images-source/sdc-form-curation.pptx
+++ b/background/images-source/sdc-form-curation.pptx
@@ -7,7 +7,7 @@
   <p:sldIdLst>
     <p:sldId id="257" r:id="rId5"/>
   </p:sldIdLst>
-  <p:sldSz cx="4860925" cy="2160588"/>
+  <p:sldSz cx="2879725" cy="2160588"/>
   <p:notesSz cx="6858000" cy="9144000"/>
   <p:defaultTextStyle>
     <a:defPPr>
@@ -104,6 +104,22 @@
       </a:defRPr>
     </a:lvl9pPr>
   </p:defaultTextStyle>
+  <p:extLst>
+    <p:ext uri="{EFAFB233-063F-42B5-8137-9DF3F51BA10A}">
+      <p15:sldGuideLst xmlns:p15="http://schemas.microsoft.com/office/powerpoint/2012/main">
+        <p15:guide id="1" orient="horz" pos="681" userDrawn="1">
+          <p15:clr>
+            <a:srgbClr val="A4A3A4"/>
+          </p15:clr>
+        </p15:guide>
+        <p15:guide id="2" pos="908" userDrawn="1">
+          <p15:clr>
+            <a:srgbClr val="A4A3A4"/>
+          </p15:clr>
+        </p15:guide>
+      </p15:sldGuideLst>
+    </p:ext>
+  </p:extLst>
 </p:presentation>
 </file>
 
@@ -136,8 +152,8 @@
         </p:nvSpPr>
         <p:spPr>
           <a:xfrm>
-            <a:off x="364572" y="671185"/>
-            <a:ext cx="4131787" cy="463126"/>
+            <a:off x="215981" y="671185"/>
+            <a:ext cx="2447767" cy="463126"/>
           </a:xfrm>
         </p:spPr>
         <p:txBody>
@@ -145,10 +161,9 @@
           <a:lstStyle/>
           <a:p>
             <a:r>
-              <a:rPr lang="en-US" smtClean="0"/>
+              <a:rPr lang="en-US"/>
               <a:t>Click to edit Master title style</a:t>
             </a:r>
-            <a:endParaRPr lang="en-US"/>
           </a:p>
         </p:txBody>
       </p:sp>
@@ -164,8 +179,8 @@
         </p:nvSpPr>
         <p:spPr>
           <a:xfrm>
-            <a:off x="729145" y="1224336"/>
-            <a:ext cx="3402648" cy="552150"/>
+            <a:off x="431962" y="1224336"/>
+            <a:ext cx="2015808" cy="552150"/>
           </a:xfrm>
         </p:spPr>
         <p:txBody>
@@ -264,10 +279,9 @@
           </a:lstStyle>
           <a:p>
             <a:r>
-              <a:rPr lang="en-US" smtClean="0"/>
+              <a:rPr lang="en-US"/>
               <a:t>Click to edit Master subtitle style</a:t>
             </a:r>
-            <a:endParaRPr lang="en-US"/>
           </a:p>
         </p:txBody>
       </p:sp>
@@ -289,7 +303,7 @@
             <a:fld id="{C69E31BE-431C-4F96-86FE-0099C953F73C}" type="datetimeFigureOut">
               <a:rPr lang="en-US" smtClean="0"/>
               <a:pPr/>
-              <a:t>9/16/2015</a:t>
+              <a:t>8/28/2018</a:t>
             </a:fld>
             <a:endParaRPr lang="en-US"/>
           </a:p>
@@ -341,7 +355,7 @@
     </p:spTree>
     <p:extLst>
       <p:ext uri="{BB962C8B-B14F-4D97-AF65-F5344CB8AC3E}">
-        <p14:creationId xmlns="" xmlns:p14="http://schemas.microsoft.com/office/powerpoint/2010/main" val="2187467626"/>
+        <p14:creationId xmlns:p14="http://schemas.microsoft.com/office/powerpoint/2010/main" val="2187467626"/>
       </p:ext>
     </p:extLst>
   </p:cSld>
@@ -384,10 +398,9 @@
           <a:lstStyle/>
           <a:p>
             <a:r>
-              <a:rPr lang="en-US" smtClean="0"/>
+              <a:rPr lang="en-US"/>
               <a:t>Click to edit Master title style</a:t>
             </a:r>
-            <a:endParaRPr lang="en-US"/>
           </a:p>
         </p:txBody>
       </p:sp>
@@ -408,38 +421,37 @@
           <a:p>
             <a:pPr lvl="0"/>
             <a:r>
-              <a:rPr lang="en-US" smtClean="0"/>
+              <a:rPr lang="en-US"/>
               <a:t>Click to edit Master text styles</a:t>
             </a:r>
           </a:p>
           <a:p>
             <a:pPr lvl="1"/>
             <a:r>
-              <a:rPr lang="en-US" smtClean="0"/>
+              <a:rPr lang="en-US"/>
               <a:t>Second level</a:t>
             </a:r>
           </a:p>
           <a:p>
             <a:pPr lvl="2"/>
             <a:r>
-              <a:rPr lang="en-US" smtClean="0"/>
+              <a:rPr lang="en-US"/>
               <a:t>Third level</a:t>
             </a:r>
           </a:p>
           <a:p>
             <a:pPr lvl="3"/>
             <a:r>
-              <a:rPr lang="en-US" smtClean="0"/>
+              <a:rPr lang="en-US"/>
               <a:t>Fourth level</a:t>
             </a:r>
           </a:p>
           <a:p>
             <a:pPr lvl="4"/>
             <a:r>
-              <a:rPr lang="en-US" smtClean="0"/>
+              <a:rPr lang="en-US"/>
               <a:t>Fifth level</a:t>
             </a:r>
-            <a:endParaRPr lang="en-US"/>
           </a:p>
         </p:txBody>
       </p:sp>
@@ -461,7 +473,7 @@
             <a:fld id="{C69E31BE-431C-4F96-86FE-0099C953F73C}" type="datetimeFigureOut">
               <a:rPr lang="en-US" smtClean="0"/>
               <a:pPr/>
-              <a:t>9/16/2015</a:t>
+              <a:t>8/28/2018</a:t>
             </a:fld>
             <a:endParaRPr lang="en-US"/>
           </a:p>
@@ -513,7 +525,7 @@
     </p:spTree>
     <p:extLst>
       <p:ext uri="{BB962C8B-B14F-4D97-AF65-F5344CB8AC3E}">
-        <p14:creationId xmlns="" xmlns:p14="http://schemas.microsoft.com/office/powerpoint/2010/main" val="790259655"/>
+        <p14:creationId xmlns:p14="http://schemas.microsoft.com/office/powerpoint/2010/main" val="790259655"/>
       </p:ext>
     </p:extLst>
   </p:cSld>
@@ -552,8 +564,8 @@
         </p:nvSpPr>
         <p:spPr>
           <a:xfrm>
-            <a:off x="2643134" y="161547"/>
-            <a:ext cx="820283" cy="3440937"/>
+            <a:off x="1565854" y="161548"/>
+            <a:ext cx="485955" cy="3440937"/>
           </a:xfrm>
         </p:spPr>
         <p:txBody>
@@ -561,10 +573,9 @@
           <a:lstStyle/>
           <a:p>
             <a:r>
-              <a:rPr lang="en-US" smtClean="0"/>
+              <a:rPr lang="en-US"/>
               <a:t>Click to edit Master title style</a:t>
             </a:r>
-            <a:endParaRPr lang="en-US"/>
           </a:p>
         </p:txBody>
       </p:sp>
@@ -580,8 +591,8 @@
         </p:nvSpPr>
         <p:spPr>
           <a:xfrm>
-            <a:off x="182292" y="161547"/>
-            <a:ext cx="2379828" cy="3440937"/>
+            <a:off x="107994" y="161548"/>
+            <a:ext cx="1409865" cy="3440937"/>
           </a:xfrm>
         </p:spPr>
         <p:txBody>
@@ -590,38 +601,37 @@
           <a:p>
             <a:pPr lvl="0"/>
             <a:r>
-              <a:rPr lang="en-US" smtClean="0"/>
+              <a:rPr lang="en-US"/>
               <a:t>Click to edit Master text styles</a:t>
             </a:r>
           </a:p>
           <a:p>
             <a:pPr lvl="1"/>
             <a:r>
-              <a:rPr lang="en-US" smtClean="0"/>
+              <a:rPr lang="en-US"/>
               <a:t>Second level</a:t>
             </a:r>
           </a:p>
           <a:p>
             <a:pPr lvl="2"/>
             <a:r>
-              <a:rPr lang="en-US" smtClean="0"/>
+              <a:rPr lang="en-US"/>
               <a:t>Third level</a:t>
             </a:r>
           </a:p>
           <a:p>
             <a:pPr lvl="3"/>
             <a:r>
-              <a:rPr lang="en-US" smtClean="0"/>
+              <a:rPr lang="en-US"/>
               <a:t>Fourth level</a:t>
             </a:r>
           </a:p>
           <a:p>
             <a:pPr lvl="4"/>
             <a:r>
-              <a:rPr lang="en-US" smtClean="0"/>
+              <a:rPr lang="en-US"/>
               <a:t>Fifth level</a:t>
             </a:r>
-            <a:endParaRPr lang="en-US"/>
           </a:p>
         </p:txBody>
       </p:sp>
@@ -643,7 +653,7 @@
             <a:fld id="{C69E31BE-431C-4F96-86FE-0099C953F73C}" type="datetimeFigureOut">
               <a:rPr lang="en-US" smtClean="0"/>
               <a:pPr/>
-              <a:t>9/16/2015</a:t>
+              <a:t>8/28/2018</a:t>
             </a:fld>
             <a:endParaRPr lang="en-US"/>
           </a:p>
@@ -695,7 +705,7 @@
     </p:spTree>
     <p:extLst>
       <p:ext uri="{BB962C8B-B14F-4D97-AF65-F5344CB8AC3E}">
-        <p14:creationId xmlns="" xmlns:p14="http://schemas.microsoft.com/office/powerpoint/2010/main" val="502563980"/>
+        <p14:creationId xmlns:p14="http://schemas.microsoft.com/office/powerpoint/2010/main" val="502563980"/>
       </p:ext>
     </p:extLst>
   </p:cSld>
@@ -738,10 +748,9 @@
           <a:lstStyle/>
           <a:p>
             <a:r>
-              <a:rPr lang="en-US" smtClean="0"/>
+              <a:rPr lang="en-US"/>
               <a:t>Click to edit Master title style</a:t>
             </a:r>
-            <a:endParaRPr lang="en-US"/>
           </a:p>
         </p:txBody>
       </p:sp>
@@ -762,38 +771,37 @@
           <a:p>
             <a:pPr lvl="0"/>
             <a:r>
-              <a:rPr lang="en-US" smtClean="0"/>
+              <a:rPr lang="en-US"/>
               <a:t>Click to edit Master text styles</a:t>
             </a:r>
           </a:p>
           <a:p>
             <a:pPr lvl="1"/>
             <a:r>
-              <a:rPr lang="en-US" smtClean="0"/>
+              <a:rPr lang="en-US"/>
               <a:t>Second level</a:t>
             </a:r>
           </a:p>
           <a:p>
             <a:pPr lvl="2"/>
             <a:r>
-              <a:rPr lang="en-US" smtClean="0"/>
+              <a:rPr lang="en-US"/>
               <a:t>Third level</a:t>
             </a:r>
           </a:p>
           <a:p>
             <a:pPr lvl="3"/>
             <a:r>
-              <a:rPr lang="en-US" smtClean="0"/>
+              <a:rPr lang="en-US"/>
               <a:t>Fourth level</a:t>
             </a:r>
           </a:p>
           <a:p>
             <a:pPr lvl="4"/>
             <a:r>
-              <a:rPr lang="en-US" smtClean="0"/>
+              <a:rPr lang="en-US"/>
               <a:t>Fifth level</a:t>
             </a:r>
-            <a:endParaRPr lang="en-US"/>
           </a:p>
         </p:txBody>
       </p:sp>
@@ -815,7 +823,7 @@
             <a:fld id="{C69E31BE-431C-4F96-86FE-0099C953F73C}" type="datetimeFigureOut">
               <a:rPr lang="en-US" smtClean="0"/>
               <a:pPr/>
-              <a:t>9/16/2015</a:t>
+              <a:t>8/28/2018</a:t>
             </a:fld>
             <a:endParaRPr lang="en-US"/>
           </a:p>
@@ -867,7 +875,7 @@
     </p:spTree>
     <p:extLst>
       <p:ext uri="{BB962C8B-B14F-4D97-AF65-F5344CB8AC3E}">
-        <p14:creationId xmlns="" xmlns:p14="http://schemas.microsoft.com/office/powerpoint/2010/main" val="4133789058"/>
+        <p14:creationId xmlns:p14="http://schemas.microsoft.com/office/powerpoint/2010/main" val="4133789058"/>
       </p:ext>
     </p:extLst>
   </p:cSld>
@@ -906,8 +914,8 @@
         </p:nvSpPr>
         <p:spPr>
           <a:xfrm>
-            <a:off x="383982" y="1388381"/>
-            <a:ext cx="4131787" cy="429116"/>
+            <a:off x="227480" y="1388381"/>
+            <a:ext cx="2447767" cy="429116"/>
           </a:xfrm>
         </p:spPr>
         <p:txBody>
@@ -919,10 +927,9 @@
           </a:lstStyle>
           <a:p>
             <a:r>
-              <a:rPr lang="en-US" smtClean="0"/>
+              <a:rPr lang="en-US"/>
               <a:t>Click to edit Master title style</a:t>
             </a:r>
-            <a:endParaRPr lang="en-US"/>
           </a:p>
         </p:txBody>
       </p:sp>
@@ -938,8 +945,8 @@
         </p:nvSpPr>
         <p:spPr>
           <a:xfrm>
-            <a:off x="383982" y="915753"/>
-            <a:ext cx="4131787" cy="472629"/>
+            <a:off x="227480" y="915754"/>
+            <a:ext cx="2447767" cy="472629"/>
           </a:xfrm>
         </p:spPr>
         <p:txBody>
@@ -1039,7 +1046,7 @@
           <a:p>
             <a:pPr lvl="0"/>
             <a:r>
-              <a:rPr lang="en-US" smtClean="0"/>
+              <a:rPr lang="en-US"/>
               <a:t>Click to edit Master text styles</a:t>
             </a:r>
           </a:p>
@@ -1063,7 +1070,7 @@
             <a:fld id="{C69E31BE-431C-4F96-86FE-0099C953F73C}" type="datetimeFigureOut">
               <a:rPr lang="en-US" smtClean="0"/>
               <a:pPr/>
-              <a:t>9/16/2015</a:t>
+              <a:t>8/28/2018</a:t>
             </a:fld>
             <a:endParaRPr lang="en-US"/>
           </a:p>
@@ -1115,7 +1122,7 @@
     </p:spTree>
     <p:extLst>
       <p:ext uri="{BB962C8B-B14F-4D97-AF65-F5344CB8AC3E}">
-        <p14:creationId xmlns="" xmlns:p14="http://schemas.microsoft.com/office/powerpoint/2010/main" val="458461516"/>
+        <p14:creationId xmlns:p14="http://schemas.microsoft.com/office/powerpoint/2010/main" val="458461516"/>
       </p:ext>
     </p:extLst>
   </p:cSld>
@@ -1158,10 +1165,9 @@
           <a:lstStyle/>
           <a:p>
             <a:r>
-              <a:rPr lang="en-US" smtClean="0"/>
+              <a:rPr lang="en-US"/>
               <a:t>Click to edit Master title style</a:t>
             </a:r>
-            <a:endParaRPr lang="en-US"/>
           </a:p>
         </p:txBody>
       </p:sp>
@@ -1177,8 +1183,8 @@
         </p:nvSpPr>
         <p:spPr>
           <a:xfrm>
-            <a:off x="243049" y="504139"/>
-            <a:ext cx="2146909" cy="1425889"/>
+            <a:off x="143988" y="504140"/>
+            <a:ext cx="1271879" cy="1425889"/>
           </a:xfrm>
         </p:spPr>
         <p:txBody>
@@ -1215,38 +1221,37 @@
           <a:p>
             <a:pPr lvl="0"/>
             <a:r>
-              <a:rPr lang="en-US" smtClean="0"/>
+              <a:rPr lang="en-US"/>
               <a:t>Click to edit Master text styles</a:t>
             </a:r>
           </a:p>
           <a:p>
             <a:pPr lvl="1"/>
             <a:r>
-              <a:rPr lang="en-US" smtClean="0"/>
+              <a:rPr lang="en-US"/>
               <a:t>Second level</a:t>
             </a:r>
           </a:p>
           <a:p>
             <a:pPr lvl="2"/>
             <a:r>
-              <a:rPr lang="en-US" smtClean="0"/>
+              <a:rPr lang="en-US"/>
               <a:t>Third level</a:t>
             </a:r>
           </a:p>
           <a:p>
             <a:pPr lvl="3"/>
             <a:r>
-              <a:rPr lang="en-US" smtClean="0"/>
+              <a:rPr lang="en-US"/>
               <a:t>Fourth level</a:t>
             </a:r>
           </a:p>
           <a:p>
             <a:pPr lvl="4"/>
             <a:r>
-              <a:rPr lang="en-US" smtClean="0"/>
+              <a:rPr lang="en-US"/>
               <a:t>Fifth level</a:t>
             </a:r>
-            <a:endParaRPr lang="en-US"/>
           </a:p>
         </p:txBody>
       </p:sp>
@@ -1262,8 +1267,8 @@
         </p:nvSpPr>
         <p:spPr>
           <a:xfrm>
-            <a:off x="2470970" y="504139"/>
-            <a:ext cx="2146909" cy="1425889"/>
+            <a:off x="1463860" y="504140"/>
+            <a:ext cx="1271879" cy="1425889"/>
           </a:xfrm>
         </p:spPr>
         <p:txBody>
@@ -1300,38 +1305,37 @@
           <a:p>
             <a:pPr lvl="0"/>
             <a:r>
-              <a:rPr lang="en-US" smtClean="0"/>
+              <a:rPr lang="en-US"/>
               <a:t>Click to edit Master text styles</a:t>
             </a:r>
           </a:p>
           <a:p>
             <a:pPr lvl="1"/>
             <a:r>
-              <a:rPr lang="en-US" smtClean="0"/>
+              <a:rPr lang="en-US"/>
               <a:t>Second level</a:t>
             </a:r>
           </a:p>
           <a:p>
             <a:pPr lvl="2"/>
             <a:r>
-              <a:rPr lang="en-US" smtClean="0"/>
+              <a:rPr lang="en-US"/>
               <a:t>Third level</a:t>
             </a:r>
           </a:p>
           <a:p>
             <a:pPr lvl="3"/>
             <a:r>
-              <a:rPr lang="en-US" smtClean="0"/>
+              <a:rPr lang="en-US"/>
               <a:t>Fourth level</a:t>
             </a:r>
           </a:p>
           <a:p>
             <a:pPr lvl="4"/>
             <a:r>
-              <a:rPr lang="en-US" smtClean="0"/>
+              <a:rPr lang="en-US"/>
               <a:t>Fifth level</a:t>
             </a:r>
-            <a:endParaRPr lang="en-US"/>
           </a:p>
         </p:txBody>
       </p:sp>
@@ -1353,7 +1357,7 @@
             <a:fld id="{C69E31BE-431C-4F96-86FE-0099C953F73C}" type="datetimeFigureOut">
               <a:rPr lang="en-US" smtClean="0"/>
               <a:pPr/>
-              <a:t>9/16/2015</a:t>
+              <a:t>8/28/2018</a:t>
             </a:fld>
             <a:endParaRPr lang="en-US"/>
           </a:p>
@@ -1405,7 +1409,7 @@
     </p:spTree>
     <p:extLst>
       <p:ext uri="{BB962C8B-B14F-4D97-AF65-F5344CB8AC3E}">
-        <p14:creationId xmlns="" xmlns:p14="http://schemas.microsoft.com/office/powerpoint/2010/main" val="797418400"/>
+        <p14:creationId xmlns:p14="http://schemas.microsoft.com/office/powerpoint/2010/main" val="797418400"/>
       </p:ext>
     </p:extLst>
   </p:cSld>
@@ -1452,10 +1456,9 @@
           </a:lstStyle>
           <a:p>
             <a:r>
-              <a:rPr lang="en-US" smtClean="0"/>
+              <a:rPr lang="en-US"/>
               <a:t>Click to edit Master title style</a:t>
             </a:r>
-            <a:endParaRPr lang="en-US"/>
           </a:p>
         </p:txBody>
       </p:sp>
@@ -1471,8 +1474,8 @@
         </p:nvSpPr>
         <p:spPr>
           <a:xfrm>
-            <a:off x="243051" y="483632"/>
-            <a:ext cx="2147752" cy="201556"/>
+            <a:off x="143989" y="483632"/>
+            <a:ext cx="1272378" cy="201556"/>
           </a:xfrm>
         </p:spPr>
         <p:txBody>
@@ -1518,7 +1521,7 @@
           <a:p>
             <a:pPr lvl="0"/>
             <a:r>
-              <a:rPr lang="en-US" smtClean="0"/>
+              <a:rPr lang="en-US"/>
               <a:t>Click to edit Master text styles</a:t>
             </a:r>
           </a:p>
@@ -1536,8 +1539,8 @@
         </p:nvSpPr>
         <p:spPr>
           <a:xfrm>
-            <a:off x="243051" y="685187"/>
-            <a:ext cx="2147752" cy="1244840"/>
+            <a:off x="143989" y="685187"/>
+            <a:ext cx="1272378" cy="1244840"/>
           </a:xfrm>
         </p:spPr>
         <p:txBody>
@@ -1574,38 +1577,37 @@
           <a:p>
             <a:pPr lvl="0"/>
             <a:r>
-              <a:rPr lang="en-US" smtClean="0"/>
+              <a:rPr lang="en-US"/>
               <a:t>Click to edit Master text styles</a:t>
             </a:r>
           </a:p>
           <a:p>
             <a:pPr lvl="1"/>
             <a:r>
-              <a:rPr lang="en-US" smtClean="0"/>
+              <a:rPr lang="en-US"/>
               <a:t>Second level</a:t>
             </a:r>
           </a:p>
           <a:p>
             <a:pPr lvl="2"/>
             <a:r>
-              <a:rPr lang="en-US" smtClean="0"/>
+              <a:rPr lang="en-US"/>
               <a:t>Third level</a:t>
             </a:r>
           </a:p>
           <a:p>
             <a:pPr lvl="3"/>
             <a:r>
-              <a:rPr lang="en-US" smtClean="0"/>
+              <a:rPr lang="en-US"/>
               <a:t>Fourth level</a:t>
             </a:r>
           </a:p>
           <a:p>
             <a:pPr lvl="4"/>
             <a:r>
-              <a:rPr lang="en-US" smtClean="0"/>
+              <a:rPr lang="en-US"/>
               <a:t>Fifth level</a:t>
             </a:r>
-            <a:endParaRPr lang="en-US"/>
           </a:p>
         </p:txBody>
       </p:sp>
@@ -1621,8 +1623,8 @@
         </p:nvSpPr>
         <p:spPr>
           <a:xfrm>
-            <a:off x="2469288" y="483632"/>
-            <a:ext cx="2148597" cy="201556"/>
+            <a:off x="1462864" y="483632"/>
+            <a:ext cx="1272879" cy="201556"/>
           </a:xfrm>
         </p:spPr>
         <p:txBody>
@@ -1668,7 +1670,7 @@
           <a:p>
             <a:pPr lvl="0"/>
             <a:r>
-              <a:rPr lang="en-US" smtClean="0"/>
+              <a:rPr lang="en-US"/>
               <a:t>Click to edit Master text styles</a:t>
             </a:r>
           </a:p>
@@ -1686,8 +1688,8 @@
         </p:nvSpPr>
         <p:spPr>
           <a:xfrm>
-            <a:off x="2469288" y="685187"/>
-            <a:ext cx="2148597" cy="1244840"/>
+            <a:off x="1462864" y="685187"/>
+            <a:ext cx="1272879" cy="1244840"/>
           </a:xfrm>
         </p:spPr>
         <p:txBody>
@@ -1724,38 +1726,37 @@
           <a:p>
             <a:pPr lvl="0"/>
             <a:r>
-              <a:rPr lang="en-US" smtClean="0"/>
+              <a:rPr lang="en-US"/>
               <a:t>Click to edit Master text styles</a:t>
             </a:r>
           </a:p>
           <a:p>
             <a:pPr lvl="1"/>
             <a:r>
-              <a:rPr lang="en-US" smtClean="0"/>
+              <a:rPr lang="en-US"/>
               <a:t>Second level</a:t>
             </a:r>
           </a:p>
           <a:p>
             <a:pPr lvl="2"/>
             <a:r>
-              <a:rPr lang="en-US" smtClean="0"/>
+              <a:rPr lang="en-US"/>
               <a:t>Third level</a:t>
             </a:r>
           </a:p>
           <a:p>
             <a:pPr lvl="3"/>
             <a:r>
-              <a:rPr lang="en-US" smtClean="0"/>
+              <a:rPr lang="en-US"/>
               <a:t>Fourth level</a:t>
             </a:r>
           </a:p>
           <a:p>
             <a:pPr lvl="4"/>
             <a:r>
-              <a:rPr lang="en-US" smtClean="0"/>
+              <a:rPr lang="en-US"/>
               <a:t>Fifth level</a:t>
             </a:r>
-            <a:endParaRPr lang="en-US"/>
           </a:p>
         </p:txBody>
       </p:sp>
@@ -1777,7 +1778,7 @@
             <a:fld id="{C69E31BE-431C-4F96-86FE-0099C953F73C}" type="datetimeFigureOut">
               <a:rPr lang="en-US" smtClean="0"/>
               <a:pPr/>
-              <a:t>9/16/2015</a:t>
+              <a:t>8/28/2018</a:t>
             </a:fld>
             <a:endParaRPr lang="en-US"/>
           </a:p>
@@ -1829,7 +1830,7 @@
     </p:spTree>
     <p:extLst>
       <p:ext uri="{BB962C8B-B14F-4D97-AF65-F5344CB8AC3E}">
-        <p14:creationId xmlns="" xmlns:p14="http://schemas.microsoft.com/office/powerpoint/2010/main" val="202499912"/>
+        <p14:creationId xmlns:p14="http://schemas.microsoft.com/office/powerpoint/2010/main" val="202499912"/>
       </p:ext>
     </p:extLst>
   </p:cSld>
@@ -1872,10 +1873,9 @@
           <a:lstStyle/>
           <a:p>
             <a:r>
-              <a:rPr lang="en-US" smtClean="0"/>
+              <a:rPr lang="en-US"/>
               <a:t>Click to edit Master title style</a:t>
             </a:r>
-            <a:endParaRPr lang="en-US"/>
           </a:p>
         </p:txBody>
       </p:sp>
@@ -1897,7 +1897,7 @@
             <a:fld id="{C69E31BE-431C-4F96-86FE-0099C953F73C}" type="datetimeFigureOut">
               <a:rPr lang="en-US" smtClean="0"/>
               <a:pPr/>
-              <a:t>9/16/2015</a:t>
+              <a:t>8/28/2018</a:t>
             </a:fld>
             <a:endParaRPr lang="en-US"/>
           </a:p>
@@ -1949,7 +1949,7 @@
     </p:spTree>
     <p:extLst>
       <p:ext uri="{BB962C8B-B14F-4D97-AF65-F5344CB8AC3E}">
-        <p14:creationId xmlns="" xmlns:p14="http://schemas.microsoft.com/office/powerpoint/2010/main" val="1124304537"/>
+        <p14:creationId xmlns:p14="http://schemas.microsoft.com/office/powerpoint/2010/main" val="1124304537"/>
       </p:ext>
     </p:extLst>
   </p:cSld>
@@ -1994,7 +1994,7 @@
             <a:fld id="{C69E31BE-431C-4F96-86FE-0099C953F73C}" type="datetimeFigureOut">
               <a:rPr lang="en-US" smtClean="0"/>
               <a:pPr/>
-              <a:t>9/16/2015</a:t>
+              <a:t>8/28/2018</a:t>
             </a:fld>
             <a:endParaRPr lang="en-US"/>
           </a:p>
@@ -2046,7 +2046,7 @@
     </p:spTree>
     <p:extLst>
       <p:ext uri="{BB962C8B-B14F-4D97-AF65-F5344CB8AC3E}">
-        <p14:creationId xmlns="" xmlns:p14="http://schemas.microsoft.com/office/powerpoint/2010/main" val="4086690259"/>
+        <p14:creationId xmlns:p14="http://schemas.microsoft.com/office/powerpoint/2010/main" val="4086690259"/>
       </p:ext>
     </p:extLst>
   </p:cSld>
@@ -2085,8 +2085,8 @@
         </p:nvSpPr>
         <p:spPr>
           <a:xfrm>
-            <a:off x="243059" y="86026"/>
-            <a:ext cx="1599211" cy="366099"/>
+            <a:off x="143994" y="86027"/>
+            <a:ext cx="947410" cy="366099"/>
           </a:xfrm>
         </p:spPr>
         <p:txBody>
@@ -2098,10 +2098,9 @@
           </a:lstStyle>
           <a:p>
             <a:r>
-              <a:rPr lang="en-US" smtClean="0"/>
+              <a:rPr lang="en-US"/>
               <a:t>Click to edit Master title style</a:t>
             </a:r>
-            <a:endParaRPr lang="en-US"/>
           </a:p>
         </p:txBody>
       </p:sp>
@@ -2117,8 +2116,8 @@
         </p:nvSpPr>
         <p:spPr>
           <a:xfrm>
-            <a:off x="1900499" y="86027"/>
-            <a:ext cx="2717393" cy="1844002"/>
+            <a:off x="1125900" y="86027"/>
+            <a:ext cx="1609847" cy="1844002"/>
           </a:xfrm>
         </p:spPr>
         <p:txBody>
@@ -2155,38 +2154,37 @@
           <a:p>
             <a:pPr lvl="0"/>
             <a:r>
-              <a:rPr lang="en-US" smtClean="0"/>
+              <a:rPr lang="en-US"/>
               <a:t>Click to edit Master text styles</a:t>
             </a:r>
           </a:p>
           <a:p>
             <a:pPr lvl="1"/>
             <a:r>
-              <a:rPr lang="en-US" smtClean="0"/>
+              <a:rPr lang="en-US"/>
               <a:t>Second level</a:t>
             </a:r>
           </a:p>
           <a:p>
             <a:pPr lvl="2"/>
             <a:r>
-              <a:rPr lang="en-US" smtClean="0"/>
+              <a:rPr lang="en-US"/>
               <a:t>Third level</a:t>
             </a:r>
           </a:p>
           <a:p>
             <a:pPr lvl="3"/>
             <a:r>
-              <a:rPr lang="en-US" smtClean="0"/>
+              <a:rPr lang="en-US"/>
               <a:t>Fourth level</a:t>
             </a:r>
           </a:p>
           <a:p>
             <a:pPr lvl="4"/>
             <a:r>
-              <a:rPr lang="en-US" smtClean="0"/>
+              <a:rPr lang="en-US"/>
               <a:t>Fifth level</a:t>
             </a:r>
-            <a:endParaRPr lang="en-US"/>
           </a:p>
         </p:txBody>
       </p:sp>
@@ -2202,8 +2200,8 @@
         </p:nvSpPr>
         <p:spPr>
           <a:xfrm>
-            <a:off x="243059" y="452126"/>
-            <a:ext cx="1599211" cy="1477902"/>
+            <a:off x="143994" y="452126"/>
+            <a:ext cx="947410" cy="1477902"/>
           </a:xfrm>
         </p:spPr>
         <p:txBody>
@@ -2249,7 +2247,7 @@
           <a:p>
             <a:pPr lvl="0"/>
             <a:r>
-              <a:rPr lang="en-US" smtClean="0"/>
+              <a:rPr lang="en-US"/>
               <a:t>Click to edit Master text styles</a:t>
             </a:r>
           </a:p>
@@ -2273,7 +2271,7 @@
             <a:fld id="{C69E31BE-431C-4F96-86FE-0099C953F73C}" type="datetimeFigureOut">
               <a:rPr lang="en-US" smtClean="0"/>
               <a:pPr/>
-              <a:t>9/16/2015</a:t>
+              <a:t>8/28/2018</a:t>
             </a:fld>
             <a:endParaRPr lang="en-US"/>
           </a:p>
@@ -2325,7 +2323,7 @@
     </p:spTree>
     <p:extLst>
       <p:ext uri="{BB962C8B-B14F-4D97-AF65-F5344CB8AC3E}">
-        <p14:creationId xmlns="" xmlns:p14="http://schemas.microsoft.com/office/powerpoint/2010/main" val="161573557"/>
+        <p14:creationId xmlns:p14="http://schemas.microsoft.com/office/powerpoint/2010/main" val="161573557"/>
       </p:ext>
     </p:extLst>
   </p:cSld>
@@ -2364,8 +2362,8 @@
         </p:nvSpPr>
         <p:spPr>
           <a:xfrm>
-            <a:off x="952783" y="1512413"/>
-            <a:ext cx="2916555" cy="178549"/>
+            <a:off x="564451" y="1512414"/>
+            <a:ext cx="1727835" cy="178549"/>
           </a:xfrm>
         </p:spPr>
         <p:txBody>
@@ -2377,10 +2375,9 @@
           </a:lstStyle>
           <a:p>
             <a:r>
-              <a:rPr lang="en-US" smtClean="0"/>
+              <a:rPr lang="en-US"/>
               <a:t>Click to edit Master title style</a:t>
             </a:r>
-            <a:endParaRPr lang="en-US"/>
           </a:p>
         </p:txBody>
       </p:sp>
@@ -2396,8 +2393,8 @@
         </p:nvSpPr>
         <p:spPr>
           <a:xfrm>
-            <a:off x="952783" y="193053"/>
-            <a:ext cx="2916555" cy="1296353"/>
+            <a:off x="564451" y="193054"/>
+            <a:ext cx="1727835" cy="1296353"/>
           </a:xfrm>
         </p:spPr>
         <p:txBody>
@@ -2457,8 +2454,8 @@
         </p:nvSpPr>
         <p:spPr>
           <a:xfrm>
-            <a:off x="952783" y="1690962"/>
-            <a:ext cx="2916555" cy="253568"/>
+            <a:off x="564451" y="1690962"/>
+            <a:ext cx="1727835" cy="253568"/>
           </a:xfrm>
         </p:spPr>
         <p:txBody>
@@ -2504,7 +2501,7 @@
           <a:p>
             <a:pPr lvl="0"/>
             <a:r>
-              <a:rPr lang="en-US" smtClean="0"/>
+              <a:rPr lang="en-US"/>
               <a:t>Click to edit Master text styles</a:t>
             </a:r>
           </a:p>
@@ -2528,7 +2525,7 @@
             <a:fld id="{C69E31BE-431C-4F96-86FE-0099C953F73C}" type="datetimeFigureOut">
               <a:rPr lang="en-US" smtClean="0"/>
               <a:pPr/>
-              <a:t>9/16/2015</a:t>
+              <a:t>8/28/2018</a:t>
             </a:fld>
             <a:endParaRPr lang="en-US"/>
           </a:p>
@@ -2580,7 +2577,7 @@
     </p:spTree>
     <p:extLst>
       <p:ext uri="{BB962C8B-B14F-4D97-AF65-F5344CB8AC3E}">
-        <p14:creationId xmlns="" xmlns:p14="http://schemas.microsoft.com/office/powerpoint/2010/main" val="1090656924"/>
+        <p14:creationId xmlns:p14="http://schemas.microsoft.com/office/powerpoint/2010/main" val="1090656924"/>
       </p:ext>
     </p:extLst>
   </p:cSld>
@@ -2624,8 +2621,8 @@
         </p:nvSpPr>
         <p:spPr>
           <a:xfrm>
-            <a:off x="243053" y="86526"/>
-            <a:ext cx="4374832" cy="360098"/>
+            <a:off x="143990" y="86526"/>
+            <a:ext cx="2591752" cy="360098"/>
           </a:xfrm>
           <a:prstGeom prst="rect">
             <a:avLst/>
@@ -2638,10 +2635,9 @@
           <a:lstStyle/>
           <a:p>
             <a:r>
-              <a:rPr lang="en-US" smtClean="0"/>
+              <a:rPr lang="en-US"/>
               <a:t>Click to edit Master title style</a:t>
             </a:r>
-            <a:endParaRPr lang="en-US"/>
           </a:p>
         </p:txBody>
       </p:sp>
@@ -2657,8 +2653,8 @@
         </p:nvSpPr>
         <p:spPr>
           <a:xfrm>
-            <a:off x="243053" y="504139"/>
-            <a:ext cx="4374832" cy="1425889"/>
+            <a:off x="143990" y="504140"/>
+            <a:ext cx="2591752" cy="1425889"/>
           </a:xfrm>
           <a:prstGeom prst="rect">
             <a:avLst/>
@@ -2672,38 +2668,37 @@
           <a:p>
             <a:pPr lvl="0"/>
             <a:r>
-              <a:rPr lang="en-US" smtClean="0"/>
+              <a:rPr lang="en-US"/>
               <a:t>Click to edit Master text styles</a:t>
             </a:r>
           </a:p>
           <a:p>
             <a:pPr lvl="1"/>
             <a:r>
-              <a:rPr lang="en-US" smtClean="0"/>
+              <a:rPr lang="en-US"/>
               <a:t>Second level</a:t>
             </a:r>
           </a:p>
           <a:p>
             <a:pPr lvl="2"/>
             <a:r>
-              <a:rPr lang="en-US" smtClean="0"/>
+              <a:rPr lang="en-US"/>
               <a:t>Third level</a:t>
             </a:r>
           </a:p>
           <a:p>
             <a:pPr lvl="3"/>
             <a:r>
-              <a:rPr lang="en-US" smtClean="0"/>
+              <a:rPr lang="en-US"/>
               <a:t>Fourth level</a:t>
             </a:r>
           </a:p>
           <a:p>
             <a:pPr lvl="4"/>
             <a:r>
-              <a:rPr lang="en-US" smtClean="0"/>
+              <a:rPr lang="en-US"/>
               <a:t>Fifth level</a:t>
             </a:r>
-            <a:endParaRPr lang="en-US"/>
           </a:p>
         </p:txBody>
       </p:sp>
@@ -2719,8 +2714,8 @@
         </p:nvSpPr>
         <p:spPr>
           <a:xfrm>
-            <a:off x="243049" y="2002548"/>
-            <a:ext cx="1134217" cy="115032"/>
+            <a:off x="143988" y="2002548"/>
+            <a:ext cx="671937" cy="115032"/>
           </a:xfrm>
           <a:prstGeom prst="rect">
             <a:avLst/>
@@ -2743,7 +2738,7 @@
             <a:fld id="{C69E31BE-431C-4F96-86FE-0099C953F73C}" type="datetimeFigureOut">
               <a:rPr lang="en-US" smtClean="0"/>
               <a:pPr/>
-              <a:t>9/16/2015</a:t>
+              <a:t>8/28/2018</a:t>
             </a:fld>
             <a:endParaRPr lang="en-US"/>
           </a:p>
@@ -2761,8 +2756,8 @@
         </p:nvSpPr>
         <p:spPr>
           <a:xfrm>
-            <a:off x="1660819" y="2002548"/>
-            <a:ext cx="1539293" cy="115032"/>
+            <a:off x="983908" y="2002548"/>
+            <a:ext cx="911913" cy="115032"/>
           </a:xfrm>
           <a:prstGeom prst="rect">
             <a:avLst/>
@@ -2798,8 +2793,8 @@
         </p:nvSpPr>
         <p:spPr>
           <a:xfrm>
-            <a:off x="3483665" y="2002548"/>
-            <a:ext cx="1134217" cy="115032"/>
+            <a:off x="2063804" y="2002548"/>
+            <a:ext cx="671937" cy="115032"/>
           </a:xfrm>
           <a:prstGeom prst="rect">
             <a:avLst/>
@@ -2831,7 +2826,7 @@
     </p:spTree>
     <p:extLst>
       <p:ext uri="{BB962C8B-B14F-4D97-AF65-F5344CB8AC3E}">
-        <p14:creationId xmlns="" xmlns:p14="http://schemas.microsoft.com/office/powerpoint/2010/main" val="2194502168"/>
+        <p14:creationId xmlns:p14="http://schemas.microsoft.com/office/powerpoint/2010/main" val="2194502168"/>
       </p:ext>
     </p:extLst>
   </p:cSld>
@@ -3127,7 +3122,7 @@
         </p:nvSpPr>
         <p:spPr>
           <a:xfrm>
-            <a:off x="2060118" y="97071"/>
+            <a:off x="124972" y="97072"/>
             <a:ext cx="827619" cy="1943815"/>
           </a:xfrm>
           <a:prstGeom prst="rect">
@@ -3157,16 +3152,12 @@
           <a:p>
             <a:pPr algn="ctr"/>
             <a:r>
-              <a:rPr lang="en-CA" b="1" dirty="0" smtClean="0">
+              <a:rPr lang="en-CA" b="1" dirty="0">
                 <a:latin typeface="Arial" pitchFamily="34" charset="0"/>
                 <a:cs typeface="Arial" pitchFamily="34" charset="0"/>
               </a:rPr>
               <a:t>Form Designer</a:t>
             </a:r>
-            <a:endParaRPr lang="en-CA" b="1" dirty="0">
-              <a:latin typeface="Arial" pitchFamily="34" charset="0"/>
-              <a:cs typeface="Arial" pitchFamily="34" charset="0"/>
-            </a:endParaRPr>
           </a:p>
         </p:txBody>
       </p:sp>
@@ -3178,7 +3169,7 @@
         </p:nvSpPr>
         <p:spPr>
           <a:xfrm>
-            <a:off x="4003536" y="97071"/>
+            <a:off x="2068391" y="97072"/>
             <a:ext cx="743071" cy="1943815"/>
           </a:xfrm>
           <a:prstGeom prst="rect">
@@ -3208,16 +3199,12 @@
           <a:p>
             <a:pPr algn="ctr"/>
             <a:r>
-              <a:rPr lang="en-CA" dirty="0" smtClean="0">
+              <a:rPr lang="en-CA" dirty="0">
                 <a:latin typeface="Arial" pitchFamily="34" charset="0"/>
                 <a:cs typeface="Arial" pitchFamily="34" charset="0"/>
               </a:rPr>
               <a:t>Form Manager</a:t>
             </a:r>
-            <a:endParaRPr lang="en-CA" dirty="0">
-              <a:latin typeface="Arial" pitchFamily="34" charset="0"/>
-              <a:cs typeface="Arial" pitchFamily="34" charset="0"/>
-            </a:endParaRPr>
           </a:p>
         </p:txBody>
       </p:sp>
@@ -3229,7 +3216,7 @@
         </p:nvCxnSpPr>
         <p:spPr>
           <a:xfrm>
-            <a:off x="2887738" y="668782"/>
+            <a:off x="952592" y="668782"/>
             <a:ext cx="1115798" cy="0"/>
           </a:xfrm>
           <a:prstGeom prst="straightConnector1">
@@ -3262,7 +3249,7 @@
         </p:nvSpPr>
         <p:spPr>
           <a:xfrm>
-            <a:off x="2887737" y="691496"/>
+            <a:off x="952591" y="691496"/>
             <a:ext cx="1086027" cy="541198"/>
           </a:xfrm>
           <a:prstGeom prst="rect">
@@ -3295,7 +3282,7 @@
           <a:p>
             <a:pPr algn="ctr"/>
             <a:r>
-              <a:rPr lang="en-CA" sz="1100" dirty="0" smtClean="0">
+              <a:rPr lang="en-CA" sz="1100" dirty="0">
                 <a:solidFill>
                   <a:schemeClr val="tx1"/>
                 </a:solidFill>
@@ -3305,7 +3292,7 @@
               <a:t>Query, Create, Update, Delete</a:t>
             </a:r>
             <a:br>
-              <a:rPr lang="en-CA" sz="1100" dirty="0" smtClean="0">
+              <a:rPr lang="en-CA" sz="1100" dirty="0">
                 <a:solidFill>
                   <a:schemeClr val="tx1"/>
                 </a:solidFill>
@@ -3314,7 +3301,7 @@
               </a:rPr>
             </a:br>
             <a:r>
-              <a:rPr lang="en-CA" sz="1100" b="1" dirty="0" smtClean="0">
+              <a:rPr lang="en-CA" sz="1100" b="1" dirty="0">
                 <a:solidFill>
                   <a:schemeClr val="tx1"/>
                 </a:solidFill>
@@ -3334,7 +3321,7 @@
         </p:nvSpPr>
         <p:spPr>
           <a:xfrm>
-            <a:off x="2897225" y="1412006"/>
+            <a:off x="962079" y="1412007"/>
             <a:ext cx="1086027" cy="628881"/>
           </a:xfrm>
           <a:prstGeom prst="rect">
@@ -3367,7 +3354,7 @@
           <a:p>
             <a:pPr algn="ctr"/>
             <a:r>
-              <a:rPr lang="en-CA" sz="1100" dirty="0" smtClean="0">
+              <a:rPr lang="en-CA" sz="1100" dirty="0">
                 <a:solidFill>
                   <a:schemeClr val="tx1"/>
                 </a:solidFill>
@@ -3377,7 +3364,7 @@
               <a:t>Query, Create, Update, Delete</a:t>
             </a:r>
             <a:br>
-              <a:rPr lang="en-CA" sz="1100" dirty="0" smtClean="0">
+              <a:rPr lang="en-CA" sz="1100" dirty="0">
                 <a:solidFill>
                   <a:schemeClr val="tx1"/>
                 </a:solidFill>
@@ -3386,7 +3373,7 @@
               </a:rPr>
             </a:br>
             <a:r>
-              <a:rPr lang="en-CA" sz="1100" b="1" dirty="0" smtClean="0">
+              <a:rPr lang="en-CA" sz="1100" b="1" dirty="0">
                 <a:solidFill>
                   <a:schemeClr val="tx1"/>
                 </a:solidFill>
@@ -3406,165 +3393,7 @@
         </p:nvCxnSpPr>
         <p:spPr>
           <a:xfrm>
-            <a:off x="2887738" y="1469176"/>
-            <a:ext cx="1115798" cy="0"/>
-          </a:xfrm>
-          <a:prstGeom prst="straightConnector1">
-            <a:avLst/>
-          </a:prstGeom>
-          <a:ln w="19050">
-            <a:tailEnd type="arrow"/>
-          </a:ln>
-        </p:spPr>
-        <p:style>
-          <a:lnRef idx="1">
-            <a:schemeClr val="accent1"/>
-          </a:lnRef>
-          <a:fillRef idx="0">
-            <a:schemeClr val="accent1"/>
-          </a:fillRef>
-          <a:effectRef idx="0">
-            <a:schemeClr val="accent1"/>
-          </a:effectRef>
-          <a:fontRef idx="minor">
-            <a:schemeClr val="tx1"/>
-          </a:fontRef>
-        </p:style>
-      </p:cxnSp>
-      <p:sp>
-        <p:nvSpPr>
-          <p:cNvPr id="39" name="Rectangle 38"/>
-          <p:cNvSpPr/>
-          <p:nvPr/>
-        </p:nvSpPr>
-        <p:spPr>
-          <a:xfrm>
-            <a:off x="201248" y="97071"/>
-            <a:ext cx="743071" cy="1943815"/>
-          </a:xfrm>
-          <a:prstGeom prst="rect">
-            <a:avLst/>
-          </a:prstGeom>
-          <a:ln w="19050"/>
-        </p:spPr>
-        <p:style>
-          <a:lnRef idx="2">
-            <a:schemeClr val="accent5">
-              <a:shade val="50000"/>
-            </a:schemeClr>
-          </a:lnRef>
-          <a:fillRef idx="1">
-            <a:schemeClr val="accent5"/>
-          </a:fillRef>
-          <a:effectRef idx="0">
-            <a:schemeClr val="accent5"/>
-          </a:effectRef>
-          <a:fontRef idx="minor">
-            <a:schemeClr val="lt1"/>
-          </a:fontRef>
-        </p:style>
-        <p:txBody>
-          <a:bodyPr lIns="68589" tIns="34295" rIns="68589" bIns="34295" rtlCol="0" anchor="ctr"/>
-          <a:lstStyle/>
-          <a:p>
-            <a:pPr algn="ctr"/>
-            <a:r>
-              <a:rPr lang="en-CA" dirty="0" smtClean="0">
-                <a:latin typeface="Arial" pitchFamily="34" charset="0"/>
-                <a:cs typeface="Arial" pitchFamily="34" charset="0"/>
-              </a:rPr>
-              <a:t>Data Element Registry</a:t>
-            </a:r>
-            <a:endParaRPr lang="en-CA" dirty="0">
-              <a:latin typeface="Arial" pitchFamily="34" charset="0"/>
-              <a:cs typeface="Arial" pitchFamily="34" charset="0"/>
-            </a:endParaRPr>
-          </a:p>
-        </p:txBody>
-      </p:sp>
-      <p:sp>
-        <p:nvSpPr>
-          <p:cNvPr id="40" name="Rectangle 39"/>
-          <p:cNvSpPr/>
-          <p:nvPr/>
-        </p:nvSpPr>
-        <p:spPr>
-          <a:xfrm>
-            <a:off x="944320" y="497269"/>
-            <a:ext cx="1086027" cy="628881"/>
-          </a:xfrm>
-          <a:prstGeom prst="rect">
-            <a:avLst/>
-          </a:prstGeom>
-          <a:noFill/>
-          <a:ln>
-            <a:noFill/>
-          </a:ln>
-        </p:spPr>
-        <p:style>
-          <a:lnRef idx="2">
-            <a:schemeClr val="accent1">
-              <a:shade val="50000"/>
-            </a:schemeClr>
-          </a:lnRef>
-          <a:fillRef idx="1">
-            <a:schemeClr val="accent1"/>
-          </a:fillRef>
-          <a:effectRef idx="0">
-            <a:schemeClr val="accent1"/>
-          </a:effectRef>
-          <a:fontRef idx="minor">
-            <a:schemeClr val="lt1"/>
-          </a:fontRef>
-        </p:style>
-        <p:txBody>
-          <a:bodyPr lIns="68589" tIns="34295" rIns="68589" bIns="34295" rtlCol="0" anchor="ctr"/>
-          <a:lstStyle/>
-          <a:p>
-            <a:pPr algn="ctr"/>
-            <a:r>
-              <a:rPr lang="en-CA" sz="1100" dirty="0" smtClean="0">
-                <a:solidFill>
-                  <a:schemeClr val="tx1"/>
-                </a:solidFill>
-                <a:latin typeface="Arial" pitchFamily="34" charset="0"/>
-                <a:cs typeface="Arial" pitchFamily="34" charset="0"/>
-              </a:rPr>
-              <a:t>Query, Create, Update, Delete</a:t>
-            </a:r>
-            <a:br>
-              <a:rPr lang="en-CA" sz="1100" dirty="0" smtClean="0">
-                <a:solidFill>
-                  <a:schemeClr val="tx1"/>
-                </a:solidFill>
-                <a:latin typeface="Arial" pitchFamily="34" charset="0"/>
-                <a:cs typeface="Arial" pitchFamily="34" charset="0"/>
-              </a:rPr>
-            </a:br>
-            <a:r>
-              <a:rPr lang="en-CA" sz="1100" b="1" dirty="0" smtClean="0">
-                <a:solidFill>
-                  <a:schemeClr val="tx1"/>
-                </a:solidFill>
-                <a:latin typeface="Arial" pitchFamily="34" charset="0"/>
-                <a:cs typeface="Arial" pitchFamily="34" charset="0"/>
-              </a:rPr>
-              <a:t>DataElement</a:t>
-            </a:r>
-          </a:p>
-        </p:txBody>
-      </p:sp>
-      <p:cxnSp>
-        <p:nvCxnSpPr>
-          <p:cNvPr id="41" name="Straight Arrow Connector 40"/>
-          <p:cNvCxnSpPr>
-            <a:stCxn id="33" idx="1"/>
-          </p:cNvCxnSpPr>
-          <p:nvPr/>
-        </p:nvCxnSpPr>
-        <p:spPr>
-          <a:xfrm flipH="1">
-            <a:off x="944320" y="1068979"/>
+            <a:off x="952592" y="1469176"/>
             <a:ext cx="1115798" cy="0"/>
           </a:xfrm>
           <a:prstGeom prst="straightConnector1">
@@ -3883,9 +3712,12 @@
 </file>
 
 <file path=customXml/item1.xml><?xml version="1.0" encoding="utf-8"?>
-<p:properties xmlns:p="http://schemas.microsoft.com/office/2006/metadata/properties" xmlns:xsi="http://www.w3.org/2001/XMLSchema-instance">
-  <documentManagement/>
-</p:properties>
+<?mso-contentType ?>
+<FormTemplates xmlns="http://schemas.microsoft.com/sharepoint/v3/contenttype/forms">
+  <Display>DocumentLibraryForm</Display>
+  <Edit>DocumentLibraryForm</Edit>
+  <New>DocumentLibraryForm</New>
+</FormTemplates>
 </file>
 
 <file path=customXml/item2.xml><?xml version="1.0" encoding="utf-8"?>
@@ -3938,24 +3770,15 @@
 </file>
 
 <file path=customXml/item3.xml><?xml version="1.0" encoding="utf-8"?>
-<?mso-contentType ?>
-<FormTemplates xmlns="http://schemas.microsoft.com/sharepoint/v3/contenttype/forms">
-  <Display>DocumentLibraryForm</Display>
-  <Edit>DocumentLibraryForm</Edit>
-  <New>DocumentLibraryForm</New>
-</FormTemplates>
+<p:properties xmlns:p="http://schemas.microsoft.com/office/2006/metadata/properties" xmlns:xsi="http://www.w3.org/2001/XMLSchema-instance">
+  <documentManagement/>
+</p:properties>
 </file>
 
 <file path=customXml/itemProps1.xml><?xml version="1.0" encoding="utf-8"?>
-<ds:datastoreItem xmlns:ds="http://schemas.openxmlformats.org/officeDocument/2006/customXml" ds:itemID="{AA05AFCB-176E-411D-8F54-3F7328DC8DF9}">
+<ds:datastoreItem xmlns:ds="http://schemas.openxmlformats.org/officeDocument/2006/customXml" ds:itemID="{93867DCD-913B-4BE7-B218-6A941DDB47CC}">
   <ds:schemaRefs>
-    <ds:schemaRef ds:uri="http://schemas.microsoft.com/office/2006/documentManagement/types"/>
-    <ds:schemaRef ds:uri="http://purl.org/dc/terms/"/>
-    <ds:schemaRef ds:uri="http://schemas.microsoft.com/office/2006/metadata/properties"/>
-    <ds:schemaRef ds:uri="http://purl.org/dc/dcmitype/"/>
-    <ds:schemaRef ds:uri="http://www.w3.org/XML/1998/namespace"/>
-    <ds:schemaRef ds:uri="http://schemas.openxmlformats.org/package/2006/metadata/core-properties"/>
-    <ds:schemaRef ds:uri="http://purl.org/dc/elements/1.1/"/>
+    <ds:schemaRef ds:uri="http://schemas.microsoft.com/sharepoint/v3/contenttype/forms"/>
   </ds:schemaRefs>
 </ds:datastoreItem>
 </file>
@@ -3976,9 +3799,15 @@
 </file>
 
 <file path=customXml/itemProps3.xml><?xml version="1.0" encoding="utf-8"?>
-<ds:datastoreItem xmlns:ds="http://schemas.openxmlformats.org/officeDocument/2006/customXml" ds:itemID="{93867DCD-913B-4BE7-B218-6A941DDB47CC}">
+<ds:datastoreItem xmlns:ds="http://schemas.openxmlformats.org/officeDocument/2006/customXml" ds:itemID="{AA05AFCB-176E-411D-8F54-3F7328DC8DF9}">
   <ds:schemaRefs>
-    <ds:schemaRef ds:uri="http://schemas.microsoft.com/sharepoint/v3/contenttype/forms"/>
+    <ds:schemaRef ds:uri="http://schemas.microsoft.com/office/2006/documentManagement/types"/>
+    <ds:schemaRef ds:uri="http://purl.org/dc/terms/"/>
+    <ds:schemaRef ds:uri="http://schemas.microsoft.com/office/2006/metadata/properties"/>
+    <ds:schemaRef ds:uri="http://purl.org/dc/dcmitype/"/>
+    <ds:schemaRef ds:uri="http://www.w3.org/XML/1998/namespace"/>
+    <ds:schemaRef ds:uri="http://schemas.openxmlformats.org/package/2006/metadata/core-properties"/>
+    <ds:schemaRef ds:uri="http://purl.org/dc/elements/1.1/"/>
   </ds:schemaRefs>
 </ds:datastoreItem>
 </file>
</xml_diff>